<commit_message>
Added organizational structure of team
</commit_message>
<xml_diff>
--- a/img/images.pptx
+++ b/img/images.pptx
@@ -6,6 +6,7 @@
   </p:sldMasterIdLst>
   <p:sldIdLst>
     <p:sldId id="256" r:id="rId2"/>
+    <p:sldId id="257" r:id="rId3"/>
   </p:sldIdLst>
   <p:sldSz cx="9144000" cy="6858000" type="screen4x3"/>
   <p:notesSz cx="6858000" cy="9144000"/>
@@ -288,7 +289,7 @@
           <a:p>
             <a:fld id="{B8B1A4AE-6683-4987-B0C6-6D01B84280F1}" type="datetimeFigureOut">
               <a:rPr lang="en-CA" smtClean="0"/>
-              <a:t>28/04/2014</a:t>
+              <a:t>29/04/2014</a:t>
             </a:fld>
             <a:endParaRPr lang="en-CA"/>
           </a:p>
@@ -458,7 +459,7 @@
           <a:p>
             <a:fld id="{B8B1A4AE-6683-4987-B0C6-6D01B84280F1}" type="datetimeFigureOut">
               <a:rPr lang="en-CA" smtClean="0"/>
-              <a:t>28/04/2014</a:t>
+              <a:t>29/04/2014</a:t>
             </a:fld>
             <a:endParaRPr lang="en-CA"/>
           </a:p>
@@ -638,7 +639,7 @@
           <a:p>
             <a:fld id="{B8B1A4AE-6683-4987-B0C6-6D01B84280F1}" type="datetimeFigureOut">
               <a:rPr lang="en-CA" smtClean="0"/>
-              <a:t>28/04/2014</a:t>
+              <a:t>29/04/2014</a:t>
             </a:fld>
             <a:endParaRPr lang="en-CA"/>
           </a:p>
@@ -808,7 +809,7 @@
           <a:p>
             <a:fld id="{B8B1A4AE-6683-4987-B0C6-6D01B84280F1}" type="datetimeFigureOut">
               <a:rPr lang="en-CA" smtClean="0"/>
-              <a:t>28/04/2014</a:t>
+              <a:t>29/04/2014</a:t>
             </a:fld>
             <a:endParaRPr lang="en-CA"/>
           </a:p>
@@ -1054,7 +1055,7 @@
           <a:p>
             <a:fld id="{B8B1A4AE-6683-4987-B0C6-6D01B84280F1}" type="datetimeFigureOut">
               <a:rPr lang="en-CA" smtClean="0"/>
-              <a:t>28/04/2014</a:t>
+              <a:t>29/04/2014</a:t>
             </a:fld>
             <a:endParaRPr lang="en-CA"/>
           </a:p>
@@ -1342,7 +1343,7 @@
           <a:p>
             <a:fld id="{B8B1A4AE-6683-4987-B0C6-6D01B84280F1}" type="datetimeFigureOut">
               <a:rPr lang="en-CA" smtClean="0"/>
-              <a:t>28/04/2014</a:t>
+              <a:t>29/04/2014</a:t>
             </a:fld>
             <a:endParaRPr lang="en-CA"/>
           </a:p>
@@ -1764,7 +1765,7 @@
           <a:p>
             <a:fld id="{B8B1A4AE-6683-4987-B0C6-6D01B84280F1}" type="datetimeFigureOut">
               <a:rPr lang="en-CA" smtClean="0"/>
-              <a:t>28/04/2014</a:t>
+              <a:t>29/04/2014</a:t>
             </a:fld>
             <a:endParaRPr lang="en-CA"/>
           </a:p>
@@ -1882,7 +1883,7 @@
           <a:p>
             <a:fld id="{B8B1A4AE-6683-4987-B0C6-6D01B84280F1}" type="datetimeFigureOut">
               <a:rPr lang="en-CA" smtClean="0"/>
-              <a:t>28/04/2014</a:t>
+              <a:t>29/04/2014</a:t>
             </a:fld>
             <a:endParaRPr lang="en-CA"/>
           </a:p>
@@ -1977,7 +1978,7 @@
           <a:p>
             <a:fld id="{B8B1A4AE-6683-4987-B0C6-6D01B84280F1}" type="datetimeFigureOut">
               <a:rPr lang="en-CA" smtClean="0"/>
-              <a:t>28/04/2014</a:t>
+              <a:t>29/04/2014</a:t>
             </a:fld>
             <a:endParaRPr lang="en-CA"/>
           </a:p>
@@ -2254,7 +2255,7 @@
           <a:p>
             <a:fld id="{B8B1A4AE-6683-4987-B0C6-6D01B84280F1}" type="datetimeFigureOut">
               <a:rPr lang="en-CA" smtClean="0"/>
-              <a:t>28/04/2014</a:t>
+              <a:t>29/04/2014</a:t>
             </a:fld>
             <a:endParaRPr lang="en-CA"/>
           </a:p>
@@ -2507,7 +2508,7 @@
           <a:p>
             <a:fld id="{B8B1A4AE-6683-4987-B0C6-6D01B84280F1}" type="datetimeFigureOut">
               <a:rPr lang="en-CA" smtClean="0"/>
-              <a:t>28/04/2014</a:t>
+              <a:t>29/04/2014</a:t>
             </a:fld>
             <a:endParaRPr lang="en-CA"/>
           </a:p>
@@ -2720,7 +2721,7 @@
           <a:p>
             <a:fld id="{B8B1A4AE-6683-4987-B0C6-6D01B84280F1}" type="datetimeFigureOut">
               <a:rPr lang="en-CA" smtClean="0"/>
-              <a:t>28/04/2014</a:t>
+              <a:t>29/04/2014</a:t>
             </a:fld>
             <a:endParaRPr lang="en-CA"/>
           </a:p>
@@ -3727,6 +3728,1495 @@
     <p:extLst>
       <p:ext uri="{BB962C8B-B14F-4D97-AF65-F5344CB8AC3E}">
         <p14:creationId xmlns:p14="http://schemas.microsoft.com/office/powerpoint/2010/main" val="166131196"/>
+      </p:ext>
+    </p:extLst>
+  </p:cSld>
+  <p:clrMapOvr>
+    <a:masterClrMapping/>
+  </p:clrMapOvr>
+  <p:timing>
+    <p:tnLst>
+      <p:par>
+        <p:cTn id="1" dur="indefinite" restart="never" nodeType="tmRoot"/>
+      </p:par>
+    </p:tnLst>
+  </p:timing>
+</p:sld>
+</file>
+
+<file path=ppt/slides/slide2.xml><?xml version="1.0" encoding="utf-8"?>
+<p:sld xmlns:a="http://schemas.openxmlformats.org/drawingml/2006/main" xmlns:r="http://schemas.openxmlformats.org/officeDocument/2006/relationships" xmlns:p="http://schemas.openxmlformats.org/presentationml/2006/main">
+  <p:cSld>
+    <p:spTree>
+      <p:nvGrpSpPr>
+        <p:cNvPr id="1" name=""/>
+        <p:cNvGrpSpPr/>
+        <p:nvPr/>
+      </p:nvGrpSpPr>
+      <p:grpSpPr>
+        <a:xfrm>
+          <a:off x="0" y="0"/>
+          <a:ext cx="0" cy="0"/>
+          <a:chOff x="0" y="0"/>
+          <a:chExt cx="0" cy="0"/>
+        </a:xfrm>
+      </p:grpSpPr>
+      <p:sp>
+        <p:nvSpPr>
+          <p:cNvPr id="38" name="Rectangle 37"/>
+          <p:cNvSpPr/>
+          <p:nvPr/>
+        </p:nvSpPr>
+        <p:spPr>
+          <a:xfrm>
+            <a:off x="6533198" y="3252129"/>
+            <a:ext cx="2628672" cy="3384376"/>
+          </a:xfrm>
+          <a:prstGeom prst="rect">
+            <a:avLst/>
+          </a:prstGeom>
+          <a:solidFill>
+            <a:schemeClr val="accent4">
+              <a:lumMod val="20000"/>
+              <a:lumOff val="80000"/>
+            </a:schemeClr>
+          </a:solidFill>
+          <a:ln>
+            <a:solidFill>
+              <a:schemeClr val="accent4">
+                <a:lumMod val="20000"/>
+                <a:lumOff val="80000"/>
+              </a:schemeClr>
+            </a:solidFill>
+          </a:ln>
+        </p:spPr>
+        <p:style>
+          <a:lnRef idx="2">
+            <a:schemeClr val="accent6"/>
+          </a:lnRef>
+          <a:fillRef idx="1">
+            <a:schemeClr val="lt1"/>
+          </a:fillRef>
+          <a:effectRef idx="0">
+            <a:schemeClr val="accent6"/>
+          </a:effectRef>
+          <a:fontRef idx="minor">
+            <a:schemeClr val="dk1"/>
+          </a:fontRef>
+        </p:style>
+        <p:txBody>
+          <a:bodyPr rtlCol="0" anchor="ctr"/>
+          <a:lstStyle/>
+          <a:p>
+            <a:pPr algn="ctr"/>
+            <a:endParaRPr lang="en-CA"/>
+          </a:p>
+        </p:txBody>
+      </p:sp>
+      <p:sp>
+        <p:nvSpPr>
+          <p:cNvPr id="37" name="Rectangle 36"/>
+          <p:cNvSpPr/>
+          <p:nvPr/>
+        </p:nvSpPr>
+        <p:spPr>
+          <a:xfrm>
+            <a:off x="3409097" y="3263625"/>
+            <a:ext cx="2628672" cy="3384376"/>
+          </a:xfrm>
+          <a:prstGeom prst="rect">
+            <a:avLst/>
+          </a:prstGeom>
+          <a:solidFill>
+            <a:schemeClr val="accent4">
+              <a:lumMod val="20000"/>
+              <a:lumOff val="80000"/>
+            </a:schemeClr>
+          </a:solidFill>
+          <a:ln>
+            <a:solidFill>
+              <a:schemeClr val="accent4">
+                <a:lumMod val="20000"/>
+                <a:lumOff val="80000"/>
+              </a:schemeClr>
+            </a:solidFill>
+          </a:ln>
+        </p:spPr>
+        <p:style>
+          <a:lnRef idx="2">
+            <a:schemeClr val="accent6"/>
+          </a:lnRef>
+          <a:fillRef idx="1">
+            <a:schemeClr val="lt1"/>
+          </a:fillRef>
+          <a:effectRef idx="0">
+            <a:schemeClr val="accent6"/>
+          </a:effectRef>
+          <a:fontRef idx="minor">
+            <a:schemeClr val="dk1"/>
+          </a:fontRef>
+        </p:style>
+        <p:txBody>
+          <a:bodyPr rtlCol="0" anchor="ctr"/>
+          <a:lstStyle/>
+          <a:p>
+            <a:pPr algn="ctr"/>
+            <a:endParaRPr lang="en-CA"/>
+          </a:p>
+        </p:txBody>
+      </p:sp>
+      <p:sp>
+        <p:nvSpPr>
+          <p:cNvPr id="36" name="Rectangle 35"/>
+          <p:cNvSpPr/>
+          <p:nvPr/>
+        </p:nvSpPr>
+        <p:spPr>
+          <a:xfrm>
+            <a:off x="277526" y="3287754"/>
+            <a:ext cx="2628672" cy="3384376"/>
+          </a:xfrm>
+          <a:prstGeom prst="rect">
+            <a:avLst/>
+          </a:prstGeom>
+          <a:solidFill>
+            <a:schemeClr val="accent4">
+              <a:lumMod val="20000"/>
+              <a:lumOff val="80000"/>
+            </a:schemeClr>
+          </a:solidFill>
+          <a:ln>
+            <a:solidFill>
+              <a:schemeClr val="accent4">
+                <a:lumMod val="20000"/>
+                <a:lumOff val="80000"/>
+              </a:schemeClr>
+            </a:solidFill>
+          </a:ln>
+        </p:spPr>
+        <p:style>
+          <a:lnRef idx="2">
+            <a:schemeClr val="accent6"/>
+          </a:lnRef>
+          <a:fillRef idx="1">
+            <a:schemeClr val="lt1"/>
+          </a:fillRef>
+          <a:effectRef idx="0">
+            <a:schemeClr val="accent6"/>
+          </a:effectRef>
+          <a:fontRef idx="minor">
+            <a:schemeClr val="dk1"/>
+          </a:fontRef>
+        </p:style>
+        <p:txBody>
+          <a:bodyPr rtlCol="0" anchor="ctr"/>
+          <a:lstStyle/>
+          <a:p>
+            <a:pPr algn="ctr"/>
+            <a:endParaRPr lang="en-CA"/>
+          </a:p>
+        </p:txBody>
+      </p:sp>
+      <p:sp>
+        <p:nvSpPr>
+          <p:cNvPr id="57" name="Rectangle 56"/>
+          <p:cNvSpPr/>
+          <p:nvPr/>
+        </p:nvSpPr>
+        <p:spPr>
+          <a:xfrm>
+            <a:off x="0" y="1753823"/>
+            <a:ext cx="9161869" cy="916923"/>
+          </a:xfrm>
+          <a:prstGeom prst="rect">
+            <a:avLst/>
+          </a:prstGeom>
+          <a:solidFill>
+            <a:schemeClr val="accent1">
+              <a:lumMod val="20000"/>
+              <a:lumOff val="80000"/>
+            </a:schemeClr>
+          </a:solidFill>
+          <a:ln>
+            <a:solidFill>
+              <a:schemeClr val="accent1">
+                <a:lumMod val="20000"/>
+                <a:lumOff val="80000"/>
+              </a:schemeClr>
+            </a:solidFill>
+          </a:ln>
+        </p:spPr>
+        <p:style>
+          <a:lnRef idx="2">
+            <a:schemeClr val="accent6"/>
+          </a:lnRef>
+          <a:fillRef idx="1">
+            <a:schemeClr val="lt1"/>
+          </a:fillRef>
+          <a:effectRef idx="0">
+            <a:schemeClr val="accent6"/>
+          </a:effectRef>
+          <a:fontRef idx="minor">
+            <a:schemeClr val="dk1"/>
+          </a:fontRef>
+        </p:style>
+        <p:txBody>
+          <a:bodyPr rtlCol="0" anchor="ctr"/>
+          <a:lstStyle/>
+          <a:p>
+            <a:pPr algn="ctr"/>
+            <a:endParaRPr lang="en-CA"/>
+          </a:p>
+        </p:txBody>
+      </p:sp>
+      <p:sp>
+        <p:nvSpPr>
+          <p:cNvPr id="4" name="Rectangle 3"/>
+          <p:cNvSpPr/>
+          <p:nvPr/>
+        </p:nvSpPr>
+        <p:spPr>
+          <a:xfrm>
+            <a:off x="3538026" y="551450"/>
+            <a:ext cx="2370091" cy="432048"/>
+          </a:xfrm>
+          <a:prstGeom prst="rect">
+            <a:avLst/>
+          </a:prstGeom>
+          <a:noFill/>
+          <a:ln>
+            <a:solidFill>
+              <a:srgbClr val="002060"/>
+            </a:solidFill>
+          </a:ln>
+        </p:spPr>
+        <p:style>
+          <a:lnRef idx="2">
+            <a:schemeClr val="accent1">
+              <a:shade val="50000"/>
+            </a:schemeClr>
+          </a:lnRef>
+          <a:fillRef idx="1">
+            <a:schemeClr val="accent1"/>
+          </a:fillRef>
+          <a:effectRef idx="0">
+            <a:schemeClr val="accent1"/>
+          </a:effectRef>
+          <a:fontRef idx="minor">
+            <a:schemeClr val="lt1"/>
+          </a:fontRef>
+        </p:style>
+        <p:txBody>
+          <a:bodyPr rtlCol="0" anchor="ctr"/>
+          <a:lstStyle/>
+          <a:p>
+            <a:pPr algn="ctr"/>
+            <a:r>
+              <a:rPr lang="en-CA" dirty="0" smtClean="0">
+                <a:solidFill>
+                  <a:schemeClr val="tx1"/>
+                </a:solidFill>
+              </a:rPr>
+              <a:t>Team Director</a:t>
+            </a:r>
+            <a:endParaRPr lang="en-CA" dirty="0">
+              <a:solidFill>
+                <a:schemeClr val="tx1"/>
+              </a:solidFill>
+            </a:endParaRPr>
+          </a:p>
+        </p:txBody>
+      </p:sp>
+      <p:sp>
+        <p:nvSpPr>
+          <p:cNvPr id="11" name="Rectangle 10"/>
+          <p:cNvSpPr/>
+          <p:nvPr/>
+        </p:nvSpPr>
+        <p:spPr>
+          <a:xfrm>
+            <a:off x="397792" y="1998152"/>
+            <a:ext cx="2370091" cy="432048"/>
+          </a:xfrm>
+          <a:prstGeom prst="rect">
+            <a:avLst/>
+          </a:prstGeom>
+          <a:noFill/>
+          <a:ln>
+            <a:solidFill>
+              <a:srgbClr val="002060"/>
+            </a:solidFill>
+          </a:ln>
+        </p:spPr>
+        <p:style>
+          <a:lnRef idx="2">
+            <a:schemeClr val="accent1">
+              <a:shade val="50000"/>
+            </a:schemeClr>
+          </a:lnRef>
+          <a:fillRef idx="1">
+            <a:schemeClr val="accent1"/>
+          </a:fillRef>
+          <a:effectRef idx="0">
+            <a:schemeClr val="accent1"/>
+          </a:effectRef>
+          <a:fontRef idx="minor">
+            <a:schemeClr val="lt1"/>
+          </a:fontRef>
+        </p:style>
+        <p:txBody>
+          <a:bodyPr rtlCol="0" anchor="ctr"/>
+          <a:lstStyle/>
+          <a:p>
+            <a:pPr algn="ctr"/>
+            <a:r>
+              <a:rPr lang="en-CA" dirty="0" smtClean="0">
+                <a:solidFill>
+                  <a:schemeClr val="tx1"/>
+                </a:solidFill>
+              </a:rPr>
+              <a:t>Technical Manager</a:t>
+            </a:r>
+            <a:endParaRPr lang="en-CA" dirty="0">
+              <a:solidFill>
+                <a:schemeClr val="tx1"/>
+              </a:solidFill>
+            </a:endParaRPr>
+          </a:p>
+        </p:txBody>
+      </p:sp>
+      <p:sp>
+        <p:nvSpPr>
+          <p:cNvPr id="12" name="Rectangle 11"/>
+          <p:cNvSpPr/>
+          <p:nvPr/>
+        </p:nvSpPr>
+        <p:spPr>
+          <a:xfrm>
+            <a:off x="3533891" y="1996812"/>
+            <a:ext cx="2370091" cy="432048"/>
+          </a:xfrm>
+          <a:prstGeom prst="rect">
+            <a:avLst/>
+          </a:prstGeom>
+          <a:noFill/>
+          <a:ln>
+            <a:solidFill>
+              <a:srgbClr val="002060"/>
+            </a:solidFill>
+          </a:ln>
+        </p:spPr>
+        <p:style>
+          <a:lnRef idx="2">
+            <a:schemeClr val="accent1">
+              <a:shade val="50000"/>
+            </a:schemeClr>
+          </a:lnRef>
+          <a:fillRef idx="1">
+            <a:schemeClr val="accent1"/>
+          </a:fillRef>
+          <a:effectRef idx="0">
+            <a:schemeClr val="accent1"/>
+          </a:effectRef>
+          <a:fontRef idx="minor">
+            <a:schemeClr val="lt1"/>
+          </a:fontRef>
+        </p:style>
+        <p:txBody>
+          <a:bodyPr rtlCol="0" anchor="ctr"/>
+          <a:lstStyle/>
+          <a:p>
+            <a:pPr algn="ctr"/>
+            <a:r>
+              <a:rPr lang="en-CA" dirty="0" smtClean="0">
+                <a:solidFill>
+                  <a:schemeClr val="tx1"/>
+                </a:solidFill>
+              </a:rPr>
+              <a:t>Programming Manager</a:t>
+            </a:r>
+            <a:endParaRPr lang="en-CA" dirty="0">
+              <a:solidFill>
+                <a:schemeClr val="tx1"/>
+              </a:solidFill>
+            </a:endParaRPr>
+          </a:p>
+        </p:txBody>
+      </p:sp>
+      <p:sp>
+        <p:nvSpPr>
+          <p:cNvPr id="13" name="Rectangle 12"/>
+          <p:cNvSpPr/>
+          <p:nvPr/>
+        </p:nvSpPr>
+        <p:spPr>
+          <a:xfrm>
+            <a:off x="6662488" y="1980068"/>
+            <a:ext cx="2370091" cy="432048"/>
+          </a:xfrm>
+          <a:prstGeom prst="rect">
+            <a:avLst/>
+          </a:prstGeom>
+          <a:noFill/>
+          <a:ln>
+            <a:solidFill>
+              <a:srgbClr val="002060"/>
+            </a:solidFill>
+          </a:ln>
+        </p:spPr>
+        <p:style>
+          <a:lnRef idx="2">
+            <a:schemeClr val="accent1">
+              <a:shade val="50000"/>
+            </a:schemeClr>
+          </a:lnRef>
+          <a:fillRef idx="1">
+            <a:schemeClr val="accent1"/>
+          </a:fillRef>
+          <a:effectRef idx="0">
+            <a:schemeClr val="accent1"/>
+          </a:effectRef>
+          <a:fontRef idx="minor">
+            <a:schemeClr val="lt1"/>
+          </a:fontRef>
+        </p:style>
+        <p:txBody>
+          <a:bodyPr rtlCol="0" anchor="ctr"/>
+          <a:lstStyle/>
+          <a:p>
+            <a:pPr algn="ctr"/>
+            <a:r>
+              <a:rPr lang="en-CA" dirty="0" smtClean="0">
+                <a:solidFill>
+                  <a:schemeClr val="tx1"/>
+                </a:solidFill>
+              </a:rPr>
+              <a:t>Team Coordinator</a:t>
+            </a:r>
+            <a:endParaRPr lang="en-CA" dirty="0">
+              <a:solidFill>
+                <a:schemeClr val="tx1"/>
+              </a:solidFill>
+            </a:endParaRPr>
+          </a:p>
+        </p:txBody>
+      </p:sp>
+      <p:sp>
+        <p:nvSpPr>
+          <p:cNvPr id="14" name="Rectangle 13"/>
+          <p:cNvSpPr/>
+          <p:nvPr/>
+        </p:nvSpPr>
+        <p:spPr>
+          <a:xfrm>
+            <a:off x="397791" y="3431770"/>
+            <a:ext cx="2370091" cy="432048"/>
+          </a:xfrm>
+          <a:prstGeom prst="rect">
+            <a:avLst/>
+          </a:prstGeom>
+          <a:noFill/>
+          <a:ln>
+            <a:solidFill>
+              <a:srgbClr val="002060"/>
+            </a:solidFill>
+          </a:ln>
+        </p:spPr>
+        <p:style>
+          <a:lnRef idx="2">
+            <a:schemeClr val="accent1">
+              <a:shade val="50000"/>
+            </a:schemeClr>
+          </a:lnRef>
+          <a:fillRef idx="1">
+            <a:schemeClr val="accent1"/>
+          </a:fillRef>
+          <a:effectRef idx="0">
+            <a:schemeClr val="accent1"/>
+          </a:effectRef>
+          <a:fontRef idx="minor">
+            <a:schemeClr val="lt1"/>
+          </a:fontRef>
+        </p:style>
+        <p:txBody>
+          <a:bodyPr rtlCol="0" anchor="ctr"/>
+          <a:lstStyle/>
+          <a:p>
+            <a:pPr algn="ctr"/>
+            <a:r>
+              <a:rPr lang="en-CA" dirty="0" smtClean="0">
+                <a:solidFill>
+                  <a:schemeClr val="tx1"/>
+                </a:solidFill>
+              </a:rPr>
+              <a:t>Mentors</a:t>
+            </a:r>
+            <a:endParaRPr lang="en-CA" dirty="0">
+              <a:solidFill>
+                <a:schemeClr val="tx1"/>
+              </a:solidFill>
+            </a:endParaRPr>
+          </a:p>
+        </p:txBody>
+      </p:sp>
+      <p:sp>
+        <p:nvSpPr>
+          <p:cNvPr id="15" name="Rectangle 14"/>
+          <p:cNvSpPr/>
+          <p:nvPr/>
+        </p:nvSpPr>
+        <p:spPr>
+          <a:xfrm>
+            <a:off x="397792" y="4079842"/>
+            <a:ext cx="2370091" cy="432048"/>
+          </a:xfrm>
+          <a:prstGeom prst="rect">
+            <a:avLst/>
+          </a:prstGeom>
+          <a:noFill/>
+          <a:ln>
+            <a:solidFill>
+              <a:srgbClr val="002060"/>
+            </a:solidFill>
+          </a:ln>
+        </p:spPr>
+        <p:style>
+          <a:lnRef idx="2">
+            <a:schemeClr val="accent1">
+              <a:shade val="50000"/>
+            </a:schemeClr>
+          </a:lnRef>
+          <a:fillRef idx="1">
+            <a:schemeClr val="accent1"/>
+          </a:fillRef>
+          <a:effectRef idx="0">
+            <a:schemeClr val="accent1"/>
+          </a:effectRef>
+          <a:fontRef idx="minor">
+            <a:schemeClr val="lt1"/>
+          </a:fontRef>
+        </p:style>
+        <p:txBody>
+          <a:bodyPr rtlCol="0" anchor="ctr"/>
+          <a:lstStyle/>
+          <a:p>
+            <a:pPr algn="ctr"/>
+            <a:r>
+              <a:rPr lang="en-CA" dirty="0" smtClean="0">
+                <a:solidFill>
+                  <a:schemeClr val="tx1"/>
+                </a:solidFill>
+              </a:rPr>
+              <a:t>Team Captains</a:t>
+            </a:r>
+            <a:endParaRPr lang="en-CA" dirty="0">
+              <a:solidFill>
+                <a:schemeClr val="tx1"/>
+              </a:solidFill>
+            </a:endParaRPr>
+          </a:p>
+        </p:txBody>
+      </p:sp>
+      <p:sp>
+        <p:nvSpPr>
+          <p:cNvPr id="16" name="Rectangle 15"/>
+          <p:cNvSpPr/>
+          <p:nvPr/>
+        </p:nvSpPr>
+        <p:spPr>
+          <a:xfrm>
+            <a:off x="397790" y="4727914"/>
+            <a:ext cx="2370091" cy="432048"/>
+          </a:xfrm>
+          <a:prstGeom prst="rect">
+            <a:avLst/>
+          </a:prstGeom>
+          <a:noFill/>
+          <a:ln>
+            <a:solidFill>
+              <a:srgbClr val="002060"/>
+            </a:solidFill>
+          </a:ln>
+        </p:spPr>
+        <p:style>
+          <a:lnRef idx="2">
+            <a:schemeClr val="accent1">
+              <a:shade val="50000"/>
+            </a:schemeClr>
+          </a:lnRef>
+          <a:fillRef idx="1">
+            <a:schemeClr val="accent1"/>
+          </a:fillRef>
+          <a:effectRef idx="0">
+            <a:schemeClr val="accent1"/>
+          </a:effectRef>
+          <a:fontRef idx="minor">
+            <a:schemeClr val="lt1"/>
+          </a:fontRef>
+        </p:style>
+        <p:txBody>
+          <a:bodyPr rtlCol="0" anchor="ctr"/>
+          <a:lstStyle/>
+          <a:p>
+            <a:pPr algn="ctr"/>
+            <a:r>
+              <a:rPr lang="en-CA" dirty="0" smtClean="0">
+                <a:solidFill>
+                  <a:schemeClr val="tx1"/>
+                </a:solidFill>
+              </a:rPr>
+              <a:t>Students</a:t>
+            </a:r>
+            <a:endParaRPr lang="en-CA" dirty="0">
+              <a:solidFill>
+                <a:schemeClr val="tx1"/>
+              </a:solidFill>
+            </a:endParaRPr>
+          </a:p>
+        </p:txBody>
+      </p:sp>
+      <p:sp>
+        <p:nvSpPr>
+          <p:cNvPr id="17" name="TextBox 16"/>
+          <p:cNvSpPr txBox="1"/>
+          <p:nvPr/>
+        </p:nvSpPr>
+        <p:spPr>
+          <a:xfrm>
+            <a:off x="6567486" y="5179676"/>
+            <a:ext cx="2346412" cy="1323439"/>
+          </a:xfrm>
+          <a:prstGeom prst="rect">
+            <a:avLst/>
+          </a:prstGeom>
+          <a:noFill/>
+        </p:spPr>
+        <p:txBody>
+          <a:bodyPr wrap="none" rtlCol="0">
+            <a:spAutoFit/>
+          </a:bodyPr>
+          <a:lstStyle/>
+          <a:p>
+            <a:pPr>
+              <a:buSzPct val="75000"/>
+            </a:pPr>
+            <a:r>
+              <a:rPr lang="en-CA" sz="1600" b="1" dirty="0" err="1" smtClean="0"/>
+              <a:t>Subteams</a:t>
+            </a:r>
+            <a:endParaRPr lang="en-CA" sz="1600" b="1" dirty="0" smtClean="0"/>
+          </a:p>
+          <a:p>
+            <a:pPr marL="285750" indent="-285750">
+              <a:buSzPct val="75000"/>
+              <a:buFont typeface="Wingdings" panose="05000000000000000000" pitchFamily="2" charset="2"/>
+              <a:buChar char="v"/>
+            </a:pPr>
+            <a:r>
+              <a:rPr lang="en-CA" sz="1600" dirty="0" smtClean="0"/>
+              <a:t>Outreach</a:t>
+            </a:r>
+          </a:p>
+          <a:p>
+            <a:pPr marL="285750" indent="-285750">
+              <a:buSzPct val="75000"/>
+              <a:buFont typeface="Wingdings" panose="05000000000000000000" pitchFamily="2" charset="2"/>
+              <a:buChar char="v"/>
+            </a:pPr>
+            <a:r>
+              <a:rPr lang="en-CA" sz="1600" dirty="0" smtClean="0"/>
+              <a:t>Awards</a:t>
+            </a:r>
+          </a:p>
+          <a:p>
+            <a:pPr marL="285750" indent="-285750">
+              <a:buSzPct val="75000"/>
+              <a:buFont typeface="Wingdings" panose="05000000000000000000" pitchFamily="2" charset="2"/>
+              <a:buChar char="v"/>
+            </a:pPr>
+            <a:r>
+              <a:rPr lang="en-CA" sz="1600" dirty="0" smtClean="0"/>
+              <a:t>Marketing &amp; Branding </a:t>
+            </a:r>
+            <a:br>
+              <a:rPr lang="en-CA" sz="1600" dirty="0" smtClean="0"/>
+            </a:br>
+            <a:endParaRPr lang="en-CA" sz="1600" dirty="0" smtClean="0"/>
+          </a:p>
+        </p:txBody>
+      </p:sp>
+      <p:cxnSp>
+        <p:nvCxnSpPr>
+          <p:cNvPr id="19" name="Elbow Connector 18"/>
+          <p:cNvCxnSpPr>
+            <a:stCxn id="4" idx="2"/>
+            <a:endCxn id="11" idx="0"/>
+          </p:cNvCxnSpPr>
+          <p:nvPr/>
+        </p:nvCxnSpPr>
+        <p:spPr>
+          <a:xfrm rot="5400000">
+            <a:off x="2645628" y="-79292"/>
+            <a:ext cx="1014654" cy="3140234"/>
+          </a:xfrm>
+          <a:prstGeom prst="bentConnector3">
+            <a:avLst/>
+          </a:prstGeom>
+          <a:ln w="28575">
+            <a:solidFill>
+              <a:srgbClr val="002060"/>
+            </a:solidFill>
+          </a:ln>
+        </p:spPr>
+        <p:style>
+          <a:lnRef idx="1">
+            <a:schemeClr val="accent1"/>
+          </a:lnRef>
+          <a:fillRef idx="0">
+            <a:schemeClr val="accent1"/>
+          </a:fillRef>
+          <a:effectRef idx="0">
+            <a:schemeClr val="accent1"/>
+          </a:effectRef>
+          <a:fontRef idx="minor">
+            <a:schemeClr val="tx1"/>
+          </a:fontRef>
+        </p:style>
+      </p:cxnSp>
+      <p:cxnSp>
+        <p:nvCxnSpPr>
+          <p:cNvPr id="20" name="Elbow Connector 19"/>
+          <p:cNvCxnSpPr>
+            <a:stCxn id="4" idx="2"/>
+            <a:endCxn id="13" idx="0"/>
+          </p:cNvCxnSpPr>
+          <p:nvPr/>
+        </p:nvCxnSpPr>
+        <p:spPr>
+          <a:xfrm rot="16200000" flipH="1">
+            <a:off x="5787018" y="-80448"/>
+            <a:ext cx="996570" cy="3124462"/>
+          </a:xfrm>
+          <a:prstGeom prst="bentConnector3">
+            <a:avLst>
+              <a:gd name="adj1" fmla="val 50000"/>
+            </a:avLst>
+          </a:prstGeom>
+          <a:ln w="28575">
+            <a:solidFill>
+              <a:srgbClr val="002060"/>
+            </a:solidFill>
+          </a:ln>
+        </p:spPr>
+        <p:style>
+          <a:lnRef idx="1">
+            <a:schemeClr val="accent1"/>
+          </a:lnRef>
+          <a:fillRef idx="0">
+            <a:schemeClr val="accent1"/>
+          </a:fillRef>
+          <a:effectRef idx="0">
+            <a:schemeClr val="accent1"/>
+          </a:effectRef>
+          <a:fontRef idx="minor">
+            <a:schemeClr val="tx1"/>
+          </a:fontRef>
+        </p:style>
+      </p:cxnSp>
+      <p:cxnSp>
+        <p:nvCxnSpPr>
+          <p:cNvPr id="23" name="Elbow Connector 22"/>
+          <p:cNvCxnSpPr>
+            <a:stCxn id="4" idx="2"/>
+            <a:endCxn id="12" idx="0"/>
+          </p:cNvCxnSpPr>
+          <p:nvPr/>
+        </p:nvCxnSpPr>
+        <p:spPr>
+          <a:xfrm rot="5400000">
+            <a:off x="4214348" y="1488088"/>
+            <a:ext cx="1013314" cy="4135"/>
+          </a:xfrm>
+          <a:prstGeom prst="bentConnector3">
+            <a:avLst>
+              <a:gd name="adj1" fmla="val 50000"/>
+            </a:avLst>
+          </a:prstGeom>
+          <a:ln w="28575">
+            <a:solidFill>
+              <a:srgbClr val="002060"/>
+            </a:solidFill>
+          </a:ln>
+        </p:spPr>
+        <p:style>
+          <a:lnRef idx="1">
+            <a:schemeClr val="accent1"/>
+          </a:lnRef>
+          <a:fillRef idx="0">
+            <a:schemeClr val="accent1"/>
+          </a:fillRef>
+          <a:effectRef idx="0">
+            <a:schemeClr val="accent1"/>
+          </a:effectRef>
+          <a:fontRef idx="minor">
+            <a:schemeClr val="tx1"/>
+          </a:fontRef>
+        </p:style>
+      </p:cxnSp>
+      <p:sp>
+        <p:nvSpPr>
+          <p:cNvPr id="26" name="TextBox 25"/>
+          <p:cNvSpPr txBox="1"/>
+          <p:nvPr/>
+        </p:nvSpPr>
+        <p:spPr>
+          <a:xfrm>
+            <a:off x="289401" y="5172595"/>
+            <a:ext cx="2337435" cy="1569660"/>
+          </a:xfrm>
+          <a:prstGeom prst="rect">
+            <a:avLst/>
+          </a:prstGeom>
+          <a:noFill/>
+        </p:spPr>
+        <p:txBody>
+          <a:bodyPr wrap="none" rtlCol="0">
+            <a:spAutoFit/>
+          </a:bodyPr>
+          <a:lstStyle/>
+          <a:p>
+            <a:pPr>
+              <a:buSzPct val="75000"/>
+            </a:pPr>
+            <a:r>
+              <a:rPr lang="en-CA" sz="1600" b="1" dirty="0" err="1" smtClean="0"/>
+              <a:t>Subteams</a:t>
+            </a:r>
+            <a:endParaRPr lang="en-CA" sz="1600" b="1" dirty="0" smtClean="0"/>
+          </a:p>
+          <a:p>
+            <a:pPr marL="285750" indent="-285750">
+              <a:buSzPct val="75000"/>
+              <a:buFont typeface="Wingdings" panose="05000000000000000000" pitchFamily="2" charset="2"/>
+              <a:buChar char="v"/>
+            </a:pPr>
+            <a:r>
+              <a:rPr lang="en-CA" sz="1600" dirty="0" smtClean="0"/>
+              <a:t>Safety</a:t>
+            </a:r>
+          </a:p>
+          <a:p>
+            <a:pPr marL="285750" indent="-285750">
+              <a:buSzPct val="75000"/>
+              <a:buFont typeface="Wingdings" panose="05000000000000000000" pitchFamily="2" charset="2"/>
+              <a:buChar char="v"/>
+            </a:pPr>
+            <a:r>
+              <a:rPr lang="en-CA" sz="1600" dirty="0" smtClean="0"/>
+              <a:t>Parts &amp; Tools</a:t>
+            </a:r>
+          </a:p>
+          <a:p>
+            <a:pPr marL="285750" indent="-285750">
+              <a:buSzPct val="75000"/>
+              <a:buFont typeface="Wingdings" panose="05000000000000000000" pitchFamily="2" charset="2"/>
+              <a:buChar char="v"/>
+            </a:pPr>
+            <a:r>
+              <a:rPr lang="en-CA" sz="1600" dirty="0" smtClean="0"/>
+              <a:t>Mechanical</a:t>
+            </a:r>
+          </a:p>
+          <a:p>
+            <a:pPr marL="285750" indent="-285750">
+              <a:buSzPct val="75000"/>
+              <a:buFont typeface="Wingdings" panose="05000000000000000000" pitchFamily="2" charset="2"/>
+              <a:buChar char="v"/>
+            </a:pPr>
+            <a:r>
+              <a:rPr lang="en-CA" sz="1600" dirty="0" smtClean="0"/>
+              <a:t>Electrical/Pneumatics </a:t>
+            </a:r>
+          </a:p>
+          <a:p>
+            <a:pPr>
+              <a:buSzPct val="75000"/>
+            </a:pPr>
+            <a:endParaRPr lang="en-CA" sz="1600" dirty="0" smtClean="0"/>
+          </a:p>
+        </p:txBody>
+      </p:sp>
+      <p:sp>
+        <p:nvSpPr>
+          <p:cNvPr id="27" name="TextBox 26"/>
+          <p:cNvSpPr txBox="1"/>
+          <p:nvPr/>
+        </p:nvSpPr>
+        <p:spPr>
+          <a:xfrm>
+            <a:off x="3445878" y="5172595"/>
+            <a:ext cx="2203745" cy="1077218"/>
+          </a:xfrm>
+          <a:prstGeom prst="rect">
+            <a:avLst/>
+          </a:prstGeom>
+          <a:noFill/>
+        </p:spPr>
+        <p:txBody>
+          <a:bodyPr wrap="none" rtlCol="0">
+            <a:spAutoFit/>
+          </a:bodyPr>
+          <a:lstStyle/>
+          <a:p>
+            <a:pPr>
+              <a:buSzPct val="75000"/>
+            </a:pPr>
+            <a:r>
+              <a:rPr lang="en-CA" sz="1600" b="1" dirty="0" err="1" smtClean="0"/>
+              <a:t>Subteams</a:t>
+            </a:r>
+            <a:endParaRPr lang="en-CA" sz="1600" b="1" dirty="0" smtClean="0"/>
+          </a:p>
+          <a:p>
+            <a:pPr marL="285750" indent="-285750">
+              <a:buSzPct val="75000"/>
+              <a:buFont typeface="Wingdings" panose="05000000000000000000" pitchFamily="2" charset="2"/>
+              <a:buChar char="v"/>
+            </a:pPr>
+            <a:r>
+              <a:rPr lang="en-CA" sz="1600" dirty="0" smtClean="0"/>
+              <a:t>Programming </a:t>
+            </a:r>
+          </a:p>
+          <a:p>
+            <a:pPr marL="285750" indent="-285750">
+              <a:buSzPct val="75000"/>
+              <a:buFont typeface="Wingdings" panose="05000000000000000000" pitchFamily="2" charset="2"/>
+              <a:buChar char="v"/>
+            </a:pPr>
+            <a:r>
+              <a:rPr lang="en-CA" sz="1600" dirty="0" smtClean="0"/>
+              <a:t>Strategy/Drive/Rules</a:t>
+            </a:r>
+          </a:p>
+          <a:p>
+            <a:pPr marL="285750" indent="-285750">
+              <a:buSzPct val="75000"/>
+              <a:buFont typeface="Wingdings" panose="05000000000000000000" pitchFamily="2" charset="2"/>
+              <a:buChar char="v"/>
+            </a:pPr>
+            <a:r>
+              <a:rPr lang="en-CA" sz="1600" dirty="0" smtClean="0"/>
+              <a:t>Scouting</a:t>
+            </a:r>
+            <a:endParaRPr lang="en-CA" sz="1600" dirty="0"/>
+          </a:p>
+        </p:txBody>
+      </p:sp>
+      <p:sp>
+        <p:nvSpPr>
+          <p:cNvPr id="28" name="Rectangle 27"/>
+          <p:cNvSpPr/>
+          <p:nvPr/>
+        </p:nvSpPr>
+        <p:spPr>
+          <a:xfrm>
+            <a:off x="3538027" y="3431770"/>
+            <a:ext cx="2370091" cy="432048"/>
+          </a:xfrm>
+          <a:prstGeom prst="rect">
+            <a:avLst/>
+          </a:prstGeom>
+          <a:noFill/>
+          <a:ln>
+            <a:solidFill>
+              <a:srgbClr val="002060"/>
+            </a:solidFill>
+          </a:ln>
+        </p:spPr>
+        <p:style>
+          <a:lnRef idx="2">
+            <a:schemeClr val="accent1">
+              <a:shade val="50000"/>
+            </a:schemeClr>
+          </a:lnRef>
+          <a:fillRef idx="1">
+            <a:schemeClr val="accent1"/>
+          </a:fillRef>
+          <a:effectRef idx="0">
+            <a:schemeClr val="accent1"/>
+          </a:effectRef>
+          <a:fontRef idx="minor">
+            <a:schemeClr val="lt1"/>
+          </a:fontRef>
+        </p:style>
+        <p:txBody>
+          <a:bodyPr rtlCol="0" anchor="ctr"/>
+          <a:lstStyle/>
+          <a:p>
+            <a:pPr algn="ctr"/>
+            <a:r>
+              <a:rPr lang="en-CA" dirty="0" smtClean="0">
+                <a:solidFill>
+                  <a:schemeClr val="tx1"/>
+                </a:solidFill>
+              </a:rPr>
+              <a:t>Mentors</a:t>
+            </a:r>
+            <a:endParaRPr lang="en-CA" dirty="0">
+              <a:solidFill>
+                <a:schemeClr val="tx1"/>
+              </a:solidFill>
+            </a:endParaRPr>
+          </a:p>
+        </p:txBody>
+      </p:sp>
+      <p:sp>
+        <p:nvSpPr>
+          <p:cNvPr id="29" name="Rectangle 28"/>
+          <p:cNvSpPr/>
+          <p:nvPr/>
+        </p:nvSpPr>
+        <p:spPr>
+          <a:xfrm>
+            <a:off x="3538028" y="4079842"/>
+            <a:ext cx="2370091" cy="432048"/>
+          </a:xfrm>
+          <a:prstGeom prst="rect">
+            <a:avLst/>
+          </a:prstGeom>
+          <a:noFill/>
+          <a:ln>
+            <a:solidFill>
+              <a:srgbClr val="002060"/>
+            </a:solidFill>
+          </a:ln>
+        </p:spPr>
+        <p:style>
+          <a:lnRef idx="2">
+            <a:schemeClr val="accent1">
+              <a:shade val="50000"/>
+            </a:schemeClr>
+          </a:lnRef>
+          <a:fillRef idx="1">
+            <a:schemeClr val="accent1"/>
+          </a:fillRef>
+          <a:effectRef idx="0">
+            <a:schemeClr val="accent1"/>
+          </a:effectRef>
+          <a:fontRef idx="minor">
+            <a:schemeClr val="lt1"/>
+          </a:fontRef>
+        </p:style>
+        <p:txBody>
+          <a:bodyPr rtlCol="0" anchor="ctr"/>
+          <a:lstStyle/>
+          <a:p>
+            <a:pPr algn="ctr"/>
+            <a:r>
+              <a:rPr lang="en-CA" dirty="0" smtClean="0">
+                <a:solidFill>
+                  <a:schemeClr val="tx1"/>
+                </a:solidFill>
+              </a:rPr>
+              <a:t>Team Captains</a:t>
+            </a:r>
+            <a:endParaRPr lang="en-CA" dirty="0">
+              <a:solidFill>
+                <a:schemeClr val="tx1"/>
+              </a:solidFill>
+            </a:endParaRPr>
+          </a:p>
+        </p:txBody>
+      </p:sp>
+      <p:sp>
+        <p:nvSpPr>
+          <p:cNvPr id="30" name="Rectangle 29"/>
+          <p:cNvSpPr/>
+          <p:nvPr/>
+        </p:nvSpPr>
+        <p:spPr>
+          <a:xfrm>
+            <a:off x="3538026" y="4727914"/>
+            <a:ext cx="2370091" cy="432048"/>
+          </a:xfrm>
+          <a:prstGeom prst="rect">
+            <a:avLst/>
+          </a:prstGeom>
+          <a:noFill/>
+          <a:ln>
+            <a:solidFill>
+              <a:srgbClr val="002060"/>
+            </a:solidFill>
+          </a:ln>
+        </p:spPr>
+        <p:style>
+          <a:lnRef idx="2">
+            <a:schemeClr val="accent1">
+              <a:shade val="50000"/>
+            </a:schemeClr>
+          </a:lnRef>
+          <a:fillRef idx="1">
+            <a:schemeClr val="accent1"/>
+          </a:fillRef>
+          <a:effectRef idx="0">
+            <a:schemeClr val="accent1"/>
+          </a:effectRef>
+          <a:fontRef idx="minor">
+            <a:schemeClr val="lt1"/>
+          </a:fontRef>
+        </p:style>
+        <p:txBody>
+          <a:bodyPr rtlCol="0" anchor="ctr"/>
+          <a:lstStyle/>
+          <a:p>
+            <a:pPr algn="ctr"/>
+            <a:r>
+              <a:rPr lang="en-CA" dirty="0" smtClean="0">
+                <a:solidFill>
+                  <a:schemeClr val="tx1"/>
+                </a:solidFill>
+              </a:rPr>
+              <a:t>Students</a:t>
+            </a:r>
+            <a:endParaRPr lang="en-CA" dirty="0">
+              <a:solidFill>
+                <a:schemeClr val="tx1"/>
+              </a:solidFill>
+            </a:endParaRPr>
+          </a:p>
+        </p:txBody>
+      </p:sp>
+      <p:sp>
+        <p:nvSpPr>
+          <p:cNvPr id="31" name="Rectangle 30"/>
+          <p:cNvSpPr/>
+          <p:nvPr/>
+        </p:nvSpPr>
+        <p:spPr>
+          <a:xfrm>
+            <a:off x="6662487" y="3414947"/>
+            <a:ext cx="2370091" cy="432048"/>
+          </a:xfrm>
+          <a:prstGeom prst="rect">
+            <a:avLst/>
+          </a:prstGeom>
+          <a:noFill/>
+          <a:ln>
+            <a:solidFill>
+              <a:srgbClr val="002060"/>
+            </a:solidFill>
+          </a:ln>
+        </p:spPr>
+        <p:style>
+          <a:lnRef idx="2">
+            <a:schemeClr val="accent1">
+              <a:shade val="50000"/>
+            </a:schemeClr>
+          </a:lnRef>
+          <a:fillRef idx="1">
+            <a:schemeClr val="accent1"/>
+          </a:fillRef>
+          <a:effectRef idx="0">
+            <a:schemeClr val="accent1"/>
+          </a:effectRef>
+          <a:fontRef idx="minor">
+            <a:schemeClr val="lt1"/>
+          </a:fontRef>
+        </p:style>
+        <p:txBody>
+          <a:bodyPr rtlCol="0" anchor="ctr"/>
+          <a:lstStyle/>
+          <a:p>
+            <a:pPr algn="ctr"/>
+            <a:r>
+              <a:rPr lang="en-CA" dirty="0" smtClean="0">
+                <a:solidFill>
+                  <a:schemeClr val="tx1"/>
+                </a:solidFill>
+              </a:rPr>
+              <a:t>Mentors</a:t>
+            </a:r>
+            <a:endParaRPr lang="en-CA" dirty="0">
+              <a:solidFill>
+                <a:schemeClr val="tx1"/>
+              </a:solidFill>
+            </a:endParaRPr>
+          </a:p>
+        </p:txBody>
+      </p:sp>
+      <p:sp>
+        <p:nvSpPr>
+          <p:cNvPr id="32" name="Rectangle 31"/>
+          <p:cNvSpPr/>
+          <p:nvPr/>
+        </p:nvSpPr>
+        <p:spPr>
+          <a:xfrm>
+            <a:off x="6662488" y="4063019"/>
+            <a:ext cx="2370091" cy="432048"/>
+          </a:xfrm>
+          <a:prstGeom prst="rect">
+            <a:avLst/>
+          </a:prstGeom>
+          <a:noFill/>
+          <a:ln>
+            <a:solidFill>
+              <a:srgbClr val="002060"/>
+            </a:solidFill>
+          </a:ln>
+        </p:spPr>
+        <p:style>
+          <a:lnRef idx="2">
+            <a:schemeClr val="accent1">
+              <a:shade val="50000"/>
+            </a:schemeClr>
+          </a:lnRef>
+          <a:fillRef idx="1">
+            <a:schemeClr val="accent1"/>
+          </a:fillRef>
+          <a:effectRef idx="0">
+            <a:schemeClr val="accent1"/>
+          </a:effectRef>
+          <a:fontRef idx="minor">
+            <a:schemeClr val="lt1"/>
+          </a:fontRef>
+        </p:style>
+        <p:txBody>
+          <a:bodyPr rtlCol="0" anchor="ctr"/>
+          <a:lstStyle/>
+          <a:p>
+            <a:pPr algn="ctr"/>
+            <a:r>
+              <a:rPr lang="en-CA" dirty="0" smtClean="0">
+                <a:solidFill>
+                  <a:schemeClr val="tx1"/>
+                </a:solidFill>
+              </a:rPr>
+              <a:t>Team Captains</a:t>
+            </a:r>
+            <a:endParaRPr lang="en-CA" dirty="0">
+              <a:solidFill>
+                <a:schemeClr val="tx1"/>
+              </a:solidFill>
+            </a:endParaRPr>
+          </a:p>
+        </p:txBody>
+      </p:sp>
+      <p:sp>
+        <p:nvSpPr>
+          <p:cNvPr id="33" name="Rectangle 32"/>
+          <p:cNvSpPr/>
+          <p:nvPr/>
+        </p:nvSpPr>
+        <p:spPr>
+          <a:xfrm>
+            <a:off x="6662486" y="4711091"/>
+            <a:ext cx="2370091" cy="432048"/>
+          </a:xfrm>
+          <a:prstGeom prst="rect">
+            <a:avLst/>
+          </a:prstGeom>
+          <a:noFill/>
+          <a:ln>
+            <a:solidFill>
+              <a:srgbClr val="002060"/>
+            </a:solidFill>
+          </a:ln>
+        </p:spPr>
+        <p:style>
+          <a:lnRef idx="2">
+            <a:schemeClr val="accent1">
+              <a:shade val="50000"/>
+            </a:schemeClr>
+          </a:lnRef>
+          <a:fillRef idx="1">
+            <a:schemeClr val="accent1"/>
+          </a:fillRef>
+          <a:effectRef idx="0">
+            <a:schemeClr val="accent1"/>
+          </a:effectRef>
+          <a:fontRef idx="minor">
+            <a:schemeClr val="lt1"/>
+          </a:fontRef>
+        </p:style>
+        <p:txBody>
+          <a:bodyPr rtlCol="0" anchor="ctr"/>
+          <a:lstStyle/>
+          <a:p>
+            <a:pPr algn="ctr"/>
+            <a:r>
+              <a:rPr lang="en-CA" dirty="0" smtClean="0">
+                <a:solidFill>
+                  <a:schemeClr val="tx1"/>
+                </a:solidFill>
+              </a:rPr>
+              <a:t>Students</a:t>
+            </a:r>
+            <a:endParaRPr lang="en-CA" dirty="0">
+              <a:solidFill>
+                <a:schemeClr val="tx1"/>
+              </a:solidFill>
+            </a:endParaRPr>
+          </a:p>
+        </p:txBody>
+      </p:sp>
+      <p:cxnSp>
+        <p:nvCxnSpPr>
+          <p:cNvPr id="47" name="Straight Connector 46"/>
+          <p:cNvCxnSpPr>
+            <a:stCxn id="11" idx="2"/>
+            <a:endCxn id="36" idx="0"/>
+          </p:cNvCxnSpPr>
+          <p:nvPr/>
+        </p:nvCxnSpPr>
+        <p:spPr>
+          <a:xfrm>
+            <a:off x="1582838" y="2430200"/>
+            <a:ext cx="9024" cy="857554"/>
+          </a:xfrm>
+          <a:prstGeom prst="line">
+            <a:avLst/>
+          </a:prstGeom>
+          <a:ln w="28575">
+            <a:solidFill>
+              <a:srgbClr val="002060"/>
+            </a:solidFill>
+          </a:ln>
+        </p:spPr>
+        <p:style>
+          <a:lnRef idx="1">
+            <a:schemeClr val="accent1"/>
+          </a:lnRef>
+          <a:fillRef idx="0">
+            <a:schemeClr val="accent1"/>
+          </a:fillRef>
+          <a:effectRef idx="0">
+            <a:schemeClr val="accent1"/>
+          </a:effectRef>
+          <a:fontRef idx="minor">
+            <a:schemeClr val="tx1"/>
+          </a:fontRef>
+        </p:style>
+      </p:cxnSp>
+      <p:cxnSp>
+        <p:nvCxnSpPr>
+          <p:cNvPr id="50" name="Straight Connector 49"/>
+          <p:cNvCxnSpPr>
+            <a:stCxn id="12" idx="2"/>
+            <a:endCxn id="37" idx="0"/>
+          </p:cNvCxnSpPr>
+          <p:nvPr/>
+        </p:nvCxnSpPr>
+        <p:spPr>
+          <a:xfrm>
+            <a:off x="4718937" y="2428860"/>
+            <a:ext cx="4496" cy="834765"/>
+          </a:xfrm>
+          <a:prstGeom prst="line">
+            <a:avLst/>
+          </a:prstGeom>
+          <a:ln w="28575">
+            <a:solidFill>
+              <a:srgbClr val="002060"/>
+            </a:solidFill>
+          </a:ln>
+        </p:spPr>
+        <p:style>
+          <a:lnRef idx="1">
+            <a:schemeClr val="accent1"/>
+          </a:lnRef>
+          <a:fillRef idx="0">
+            <a:schemeClr val="accent1"/>
+          </a:fillRef>
+          <a:effectRef idx="0">
+            <a:schemeClr val="accent1"/>
+          </a:effectRef>
+          <a:fontRef idx="minor">
+            <a:schemeClr val="tx1"/>
+          </a:fontRef>
+        </p:style>
+      </p:cxnSp>
+      <p:cxnSp>
+        <p:nvCxnSpPr>
+          <p:cNvPr id="53" name="Straight Connector 52"/>
+          <p:cNvCxnSpPr>
+            <a:stCxn id="13" idx="2"/>
+            <a:endCxn id="38" idx="0"/>
+          </p:cNvCxnSpPr>
+          <p:nvPr/>
+        </p:nvCxnSpPr>
+        <p:spPr>
+          <a:xfrm>
+            <a:off x="7847534" y="2412116"/>
+            <a:ext cx="0" cy="840013"/>
+          </a:xfrm>
+          <a:prstGeom prst="line">
+            <a:avLst/>
+          </a:prstGeom>
+          <a:ln w="28575">
+            <a:solidFill>
+              <a:srgbClr val="002060"/>
+            </a:solidFill>
+          </a:ln>
+        </p:spPr>
+        <p:style>
+          <a:lnRef idx="1">
+            <a:schemeClr val="accent1"/>
+          </a:lnRef>
+          <a:fillRef idx="0">
+            <a:schemeClr val="accent1"/>
+          </a:fillRef>
+          <a:effectRef idx="0">
+            <a:schemeClr val="accent1"/>
+          </a:effectRef>
+          <a:fontRef idx="minor">
+            <a:schemeClr val="tx1"/>
+          </a:fontRef>
+        </p:style>
+      </p:cxnSp>
+      <p:sp>
+        <p:nvSpPr>
+          <p:cNvPr id="58" name="TextBox 57"/>
+          <p:cNvSpPr txBox="1"/>
+          <p:nvPr/>
+        </p:nvSpPr>
+        <p:spPr>
+          <a:xfrm>
+            <a:off x="20785" y="1342509"/>
+            <a:ext cx="1496692" cy="646331"/>
+          </a:xfrm>
+          <a:prstGeom prst="rect">
+            <a:avLst/>
+          </a:prstGeom>
+          <a:noFill/>
+        </p:spPr>
+        <p:txBody>
+          <a:bodyPr wrap="none" rtlCol="0">
+            <a:spAutoFit/>
+          </a:bodyPr>
+          <a:lstStyle/>
+          <a:p>
+            <a:pPr algn="ctr"/>
+            <a:r>
+              <a:rPr lang="en-CA" dirty="0" smtClean="0"/>
+              <a:t>Management </a:t>
+            </a:r>
+          </a:p>
+          <a:p>
+            <a:pPr algn="ctr"/>
+            <a:r>
+              <a:rPr lang="en-CA" dirty="0" smtClean="0"/>
+              <a:t>Team</a:t>
+            </a:r>
+            <a:endParaRPr lang="en-CA" dirty="0"/>
+          </a:p>
+        </p:txBody>
+      </p:sp>
+    </p:spTree>
+    <p:extLst>
+      <p:ext uri="{BB962C8B-B14F-4D97-AF65-F5344CB8AC3E}">
+        <p14:creationId xmlns:p14="http://schemas.microsoft.com/office/powerpoint/2010/main" val="279999022"/>
       </p:ext>
     </p:extLst>
   </p:cSld>

</xml_diff>

<commit_message>
Updated team organization image
</commit_message>
<xml_diff>
--- a/img/images.pptx
+++ b/img/images.pptx
@@ -289,7 +289,7 @@
           <a:p>
             <a:fld id="{B8B1A4AE-6683-4987-B0C6-6D01B84280F1}" type="datetimeFigureOut">
               <a:rPr lang="en-CA" smtClean="0"/>
-              <a:t>29/04/2014</a:t>
+              <a:t>30/04/2014</a:t>
             </a:fld>
             <a:endParaRPr lang="en-CA"/>
           </a:p>
@@ -459,7 +459,7 @@
           <a:p>
             <a:fld id="{B8B1A4AE-6683-4987-B0C6-6D01B84280F1}" type="datetimeFigureOut">
               <a:rPr lang="en-CA" smtClean="0"/>
-              <a:t>29/04/2014</a:t>
+              <a:t>30/04/2014</a:t>
             </a:fld>
             <a:endParaRPr lang="en-CA"/>
           </a:p>
@@ -639,7 +639,7 @@
           <a:p>
             <a:fld id="{B8B1A4AE-6683-4987-B0C6-6D01B84280F1}" type="datetimeFigureOut">
               <a:rPr lang="en-CA" smtClean="0"/>
-              <a:t>29/04/2014</a:t>
+              <a:t>30/04/2014</a:t>
             </a:fld>
             <a:endParaRPr lang="en-CA"/>
           </a:p>
@@ -809,7 +809,7 @@
           <a:p>
             <a:fld id="{B8B1A4AE-6683-4987-B0C6-6D01B84280F1}" type="datetimeFigureOut">
               <a:rPr lang="en-CA" smtClean="0"/>
-              <a:t>29/04/2014</a:t>
+              <a:t>30/04/2014</a:t>
             </a:fld>
             <a:endParaRPr lang="en-CA"/>
           </a:p>
@@ -1055,7 +1055,7 @@
           <a:p>
             <a:fld id="{B8B1A4AE-6683-4987-B0C6-6D01B84280F1}" type="datetimeFigureOut">
               <a:rPr lang="en-CA" smtClean="0"/>
-              <a:t>29/04/2014</a:t>
+              <a:t>30/04/2014</a:t>
             </a:fld>
             <a:endParaRPr lang="en-CA"/>
           </a:p>
@@ -1343,7 +1343,7 @@
           <a:p>
             <a:fld id="{B8B1A4AE-6683-4987-B0C6-6D01B84280F1}" type="datetimeFigureOut">
               <a:rPr lang="en-CA" smtClean="0"/>
-              <a:t>29/04/2014</a:t>
+              <a:t>30/04/2014</a:t>
             </a:fld>
             <a:endParaRPr lang="en-CA"/>
           </a:p>
@@ -1765,7 +1765,7 @@
           <a:p>
             <a:fld id="{B8B1A4AE-6683-4987-B0C6-6D01B84280F1}" type="datetimeFigureOut">
               <a:rPr lang="en-CA" smtClean="0"/>
-              <a:t>29/04/2014</a:t>
+              <a:t>30/04/2014</a:t>
             </a:fld>
             <a:endParaRPr lang="en-CA"/>
           </a:p>
@@ -1883,7 +1883,7 @@
           <a:p>
             <a:fld id="{B8B1A4AE-6683-4987-B0C6-6D01B84280F1}" type="datetimeFigureOut">
               <a:rPr lang="en-CA" smtClean="0"/>
-              <a:t>29/04/2014</a:t>
+              <a:t>30/04/2014</a:t>
             </a:fld>
             <a:endParaRPr lang="en-CA"/>
           </a:p>
@@ -1978,7 +1978,7 @@
           <a:p>
             <a:fld id="{B8B1A4AE-6683-4987-B0C6-6D01B84280F1}" type="datetimeFigureOut">
               <a:rPr lang="en-CA" smtClean="0"/>
-              <a:t>29/04/2014</a:t>
+              <a:t>30/04/2014</a:t>
             </a:fld>
             <a:endParaRPr lang="en-CA"/>
           </a:p>
@@ -2255,7 +2255,7 @@
           <a:p>
             <a:fld id="{B8B1A4AE-6683-4987-B0C6-6D01B84280F1}" type="datetimeFigureOut">
               <a:rPr lang="en-CA" smtClean="0"/>
-              <a:t>29/04/2014</a:t>
+              <a:t>30/04/2014</a:t>
             </a:fld>
             <a:endParaRPr lang="en-CA"/>
           </a:p>
@@ -2508,7 +2508,7 @@
           <a:p>
             <a:fld id="{B8B1A4AE-6683-4987-B0C6-6D01B84280F1}" type="datetimeFigureOut">
               <a:rPr lang="en-CA" smtClean="0"/>
-              <a:t>29/04/2014</a:t>
+              <a:t>30/04/2014</a:t>
             </a:fld>
             <a:endParaRPr lang="en-CA"/>
           </a:p>
@@ -2721,7 +2721,7 @@
           <a:p>
             <a:fld id="{B8B1A4AE-6683-4987-B0C6-6D01B84280F1}" type="datetimeFigureOut">
               <a:rPr lang="en-CA" smtClean="0"/>
-              <a:t>29/04/2014</a:t>
+              <a:t>30/04/2014</a:t>
             </a:fld>
             <a:endParaRPr lang="en-CA"/>
           </a:p>
@@ -3769,8 +3769,8 @@
         </p:nvSpPr>
         <p:spPr>
           <a:xfrm>
-            <a:off x="6533198" y="3252129"/>
-            <a:ext cx="2628672" cy="3384376"/>
+            <a:off x="5235043" y="2900084"/>
+            <a:ext cx="1711234" cy="2037984"/>
           </a:xfrm>
           <a:prstGeom prst="rect">
             <a:avLst/>
@@ -3821,8 +3821,8 @@
         </p:nvSpPr>
         <p:spPr>
           <a:xfrm>
-            <a:off x="3409097" y="3263625"/>
-            <a:ext cx="2628672" cy="3384376"/>
+            <a:off x="3201290" y="2907007"/>
+            <a:ext cx="1711234" cy="2037984"/>
           </a:xfrm>
           <a:prstGeom prst="rect">
             <a:avLst/>
@@ -3873,8 +3873,8 @@
         </p:nvSpPr>
         <p:spPr>
           <a:xfrm>
-            <a:off x="277526" y="3287754"/>
-            <a:ext cx="2628672" cy="3384376"/>
+            <a:off x="1162674" y="2921537"/>
+            <a:ext cx="1711234" cy="2037984"/>
           </a:xfrm>
           <a:prstGeom prst="rect">
             <a:avLst/>
@@ -3925,8 +3925,8 @@
         </p:nvSpPr>
         <p:spPr>
           <a:xfrm>
-            <a:off x="0" y="1753823"/>
-            <a:ext cx="9161869" cy="916923"/>
+            <a:off x="76637" y="1997843"/>
+            <a:ext cx="6869639" cy="552147"/>
           </a:xfrm>
           <a:prstGeom prst="rect">
             <a:avLst/>
@@ -3977,8 +3977,8 @@
         </p:nvSpPr>
         <p:spPr>
           <a:xfrm>
-            <a:off x="3538026" y="551450"/>
-            <a:ext cx="2370091" cy="432048"/>
+            <a:off x="3285221" y="1273805"/>
+            <a:ext cx="1542901" cy="260168"/>
           </a:xfrm>
           <a:prstGeom prst="rect">
             <a:avLst/>
@@ -4035,8 +4035,8 @@
         </p:nvSpPr>
         <p:spPr>
           <a:xfrm>
-            <a:off x="397792" y="1998152"/>
-            <a:ext cx="2370091" cy="432048"/>
+            <a:off x="1240966" y="2144972"/>
+            <a:ext cx="1542901" cy="260168"/>
           </a:xfrm>
           <a:prstGeom prst="rect">
             <a:avLst/>
@@ -4070,14 +4070,14 @@
           <a:p>
             <a:pPr algn="ctr"/>
             <a:r>
-              <a:rPr lang="en-CA" dirty="0" smtClean="0">
+              <a:rPr lang="en-CA" sz="1200" dirty="0" smtClean="0">
                 <a:solidFill>
                   <a:schemeClr val="tx1"/>
                 </a:solidFill>
               </a:rPr>
               <a:t>Technical Manager</a:t>
             </a:r>
-            <a:endParaRPr lang="en-CA" dirty="0">
+            <a:endParaRPr lang="en-CA" sz="1200" dirty="0">
               <a:solidFill>
                 <a:schemeClr val="tx1"/>
               </a:solidFill>
@@ -4093,8 +4093,8 @@
         </p:nvSpPr>
         <p:spPr>
           <a:xfrm>
-            <a:off x="3533891" y="1996812"/>
-            <a:ext cx="2370091" cy="432048"/>
+            <a:off x="3282529" y="2144165"/>
+            <a:ext cx="1542901" cy="260168"/>
           </a:xfrm>
           <a:prstGeom prst="rect">
             <a:avLst/>
@@ -4128,14 +4128,14 @@
           <a:p>
             <a:pPr algn="ctr"/>
             <a:r>
-              <a:rPr lang="en-CA" dirty="0" smtClean="0">
+              <a:rPr lang="en-CA" sz="1100" dirty="0" smtClean="0">
                 <a:solidFill>
                   <a:schemeClr val="tx1"/>
                 </a:solidFill>
               </a:rPr>
               <a:t>Programming Manager</a:t>
             </a:r>
-            <a:endParaRPr lang="en-CA" dirty="0">
+            <a:endParaRPr lang="en-CA" sz="1100" dirty="0">
               <a:solidFill>
                 <a:schemeClr val="tx1"/>
               </a:solidFill>
@@ -4151,8 +4151,8 @@
         </p:nvSpPr>
         <p:spPr>
           <a:xfrm>
-            <a:off x="6662488" y="1980068"/>
-            <a:ext cx="2370091" cy="432048"/>
+            <a:off x="5319209" y="2134082"/>
+            <a:ext cx="1542901" cy="260168"/>
           </a:xfrm>
           <a:prstGeom prst="rect">
             <a:avLst/>
@@ -4186,14 +4186,22 @@
           <a:p>
             <a:pPr algn="ctr"/>
             <a:r>
-              <a:rPr lang="en-CA" dirty="0" smtClean="0">
+              <a:rPr lang="en-CA" sz="1200" dirty="0" smtClean="0">
                 <a:solidFill>
                   <a:schemeClr val="tx1"/>
                 </a:solidFill>
               </a:rPr>
-              <a:t>Team Coordinator</a:t>
-            </a:r>
-            <a:endParaRPr lang="en-CA" dirty="0">
+              <a:t>Team </a:t>
+            </a:r>
+            <a:r>
+              <a:rPr lang="en-CA" sz="1200" dirty="0" smtClean="0">
+                <a:solidFill>
+                  <a:schemeClr val="tx1"/>
+                </a:solidFill>
+              </a:rPr>
+              <a:t>Coordinator</a:t>
+            </a:r>
+            <a:endParaRPr lang="en-CA" sz="1200" dirty="0">
               <a:solidFill>
                 <a:schemeClr val="tx1"/>
               </a:solidFill>
@@ -4209,8 +4217,8 @@
         </p:nvSpPr>
         <p:spPr>
           <a:xfrm>
-            <a:off x="397791" y="3431770"/>
-            <a:ext cx="2370091" cy="432048"/>
+            <a:off x="1240965" y="3008259"/>
+            <a:ext cx="1542901" cy="260168"/>
           </a:xfrm>
           <a:prstGeom prst="rect">
             <a:avLst/>
@@ -4267,8 +4275,8 @@
         </p:nvSpPr>
         <p:spPr>
           <a:xfrm>
-            <a:off x="397792" y="4079842"/>
-            <a:ext cx="2370091" cy="432048"/>
+            <a:off x="1240966" y="3398512"/>
+            <a:ext cx="1542901" cy="260168"/>
           </a:xfrm>
           <a:prstGeom prst="rect">
             <a:avLst/>
@@ -4325,8 +4333,8 @@
         </p:nvSpPr>
         <p:spPr>
           <a:xfrm>
-            <a:off x="397790" y="4727914"/>
-            <a:ext cx="2370091" cy="432048"/>
+            <a:off x="1240965" y="3788764"/>
+            <a:ext cx="1542901" cy="260168"/>
           </a:xfrm>
           <a:prstGeom prst="rect">
             <a:avLst/>
@@ -4383,8 +4391,8 @@
         </p:nvSpPr>
         <p:spPr>
           <a:xfrm>
-            <a:off x="6567486" y="5179676"/>
-            <a:ext cx="2346412" cy="1323439"/>
+            <a:off x="5257364" y="4060803"/>
+            <a:ext cx="1876539" cy="1015663"/>
           </a:xfrm>
           <a:prstGeom prst="rect">
             <a:avLst/>
@@ -4401,10 +4409,10 @@
               <a:buSzPct val="75000"/>
             </a:pPr>
             <a:r>
-              <a:rPr lang="en-CA" sz="1600" b="1" dirty="0" err="1" smtClean="0"/>
+              <a:rPr lang="en-CA" sz="1200" b="1" dirty="0" err="1" smtClean="0"/>
               <a:t>Subteams</a:t>
             </a:r>
-            <a:endParaRPr lang="en-CA" sz="1600" b="1" dirty="0" smtClean="0"/>
+            <a:endParaRPr lang="en-CA" sz="1200" b="1" dirty="0" smtClean="0"/>
           </a:p>
           <a:p>
             <a:pPr marL="285750" indent="-285750">
@@ -4413,7 +4421,7 @@
               <a:buChar char="v"/>
             </a:pPr>
             <a:r>
-              <a:rPr lang="en-CA" sz="1600" dirty="0" smtClean="0"/>
+              <a:rPr lang="en-CA" sz="1200" dirty="0" smtClean="0"/>
               <a:t>Outreach</a:t>
             </a:r>
           </a:p>
@@ -4424,7 +4432,7 @@
               <a:buChar char="v"/>
             </a:pPr>
             <a:r>
-              <a:rPr lang="en-CA" sz="1600" dirty="0" smtClean="0"/>
+              <a:rPr lang="en-CA" sz="1200" dirty="0" smtClean="0"/>
               <a:t>Awards</a:t>
             </a:r>
           </a:p>
@@ -4435,13 +4443,13 @@
               <a:buChar char="v"/>
             </a:pPr>
             <a:r>
-              <a:rPr lang="en-CA" sz="1600" dirty="0" smtClean="0"/>
+              <a:rPr lang="en-CA" sz="1200" dirty="0" smtClean="0"/>
               <a:t>Marketing &amp; Branding </a:t>
             </a:r>
             <a:br>
-              <a:rPr lang="en-CA" sz="1600" dirty="0" smtClean="0"/>
+              <a:rPr lang="en-CA" sz="1200" dirty="0" smtClean="0"/>
             </a:br>
-            <a:endParaRPr lang="en-CA" sz="1600" dirty="0" smtClean="0"/>
+            <a:endParaRPr lang="en-CA" sz="1200" dirty="0" smtClean="0"/>
           </a:p>
         </p:txBody>
       </p:sp>
@@ -4456,8 +4464,8 @@
         </p:nvCxnSpPr>
         <p:spPr>
           <a:xfrm rot="5400000">
-            <a:off x="2645628" y="-79292"/>
-            <a:ext cx="1014654" cy="3140234"/>
+            <a:off x="2729045" y="817345"/>
+            <a:ext cx="610998" cy="2044255"/>
           </a:xfrm>
           <a:prstGeom prst="bentConnector3">
             <a:avLst/>
@@ -4494,8 +4502,8 @@
         </p:nvCxnSpPr>
         <p:spPr>
           <a:xfrm rot="16200000" flipH="1">
-            <a:off x="5787018" y="-80448"/>
-            <a:ext cx="996570" cy="3124462"/>
+            <a:off x="4773612" y="817034"/>
+            <a:ext cx="600109" cy="2033988"/>
           </a:xfrm>
           <a:prstGeom prst="bentConnector3">
             <a:avLst>
@@ -4534,8 +4542,8 @@
         </p:nvCxnSpPr>
         <p:spPr>
           <a:xfrm rot="5400000">
-            <a:off x="4214348" y="1488088"/>
-            <a:ext cx="1013314" cy="4135"/>
+            <a:off x="3750231" y="1837723"/>
+            <a:ext cx="610192" cy="2692"/>
           </a:xfrm>
           <a:prstGeom prst="bentConnector3">
             <a:avLst>
@@ -4571,8 +4579,8 @@
         </p:nvSpPr>
         <p:spPr>
           <a:xfrm>
-            <a:off x="289401" y="5172595"/>
-            <a:ext cx="2337435" cy="1569660"/>
+            <a:off x="1170405" y="4056539"/>
+            <a:ext cx="1860317" cy="1200329"/>
           </a:xfrm>
           <a:prstGeom prst="rect">
             <a:avLst/>
@@ -4589,10 +4597,10 @@
               <a:buSzPct val="75000"/>
             </a:pPr>
             <a:r>
-              <a:rPr lang="en-CA" sz="1600" b="1" dirty="0" err="1" smtClean="0"/>
+              <a:rPr lang="en-CA" sz="1200" b="1" dirty="0" err="1" smtClean="0"/>
               <a:t>Subteams</a:t>
             </a:r>
-            <a:endParaRPr lang="en-CA" sz="1600" b="1" dirty="0" smtClean="0"/>
+            <a:endParaRPr lang="en-CA" sz="1200" b="1" dirty="0" smtClean="0"/>
           </a:p>
           <a:p>
             <a:pPr marL="285750" indent="-285750">
@@ -4601,7 +4609,7 @@
               <a:buChar char="v"/>
             </a:pPr>
             <a:r>
-              <a:rPr lang="en-CA" sz="1600" dirty="0" smtClean="0"/>
+              <a:rPr lang="en-CA" sz="1200" dirty="0" smtClean="0"/>
               <a:t>Safety</a:t>
             </a:r>
           </a:p>
@@ -4612,7 +4620,7 @@
               <a:buChar char="v"/>
             </a:pPr>
             <a:r>
-              <a:rPr lang="en-CA" sz="1600" dirty="0" smtClean="0"/>
+              <a:rPr lang="en-CA" sz="1200" dirty="0" smtClean="0"/>
               <a:t>Parts &amp; Tools</a:t>
             </a:r>
           </a:p>
@@ -4623,7 +4631,7 @@
               <a:buChar char="v"/>
             </a:pPr>
             <a:r>
-              <a:rPr lang="en-CA" sz="1600" dirty="0" smtClean="0"/>
+              <a:rPr lang="en-CA" sz="1200" dirty="0" smtClean="0"/>
               <a:t>Mechanical</a:t>
             </a:r>
           </a:p>
@@ -4634,7 +4642,7 @@
               <a:buChar char="v"/>
             </a:pPr>
             <a:r>
-              <a:rPr lang="en-CA" sz="1600" dirty="0" smtClean="0"/>
+              <a:rPr lang="en-CA" sz="1200" dirty="0" smtClean="0"/>
               <a:t>Electrical/Pneumatics </a:t>
             </a:r>
           </a:p>
@@ -4642,7 +4650,7 @@
             <a:pPr>
               <a:buSzPct val="75000"/>
             </a:pPr>
-            <a:endParaRPr lang="en-CA" sz="1600" dirty="0" smtClean="0"/>
+            <a:endParaRPr lang="en-CA" sz="1200" dirty="0" smtClean="0"/>
           </a:p>
         </p:txBody>
       </p:sp>
@@ -4654,8 +4662,8 @@
         </p:nvSpPr>
         <p:spPr>
           <a:xfrm>
-            <a:off x="3445878" y="5172595"/>
-            <a:ext cx="2203745" cy="1077218"/>
+            <a:off x="3225234" y="4056539"/>
+            <a:ext cx="1767150" cy="830997"/>
           </a:xfrm>
           <a:prstGeom prst="rect">
             <a:avLst/>
@@ -4672,10 +4680,10 @@
               <a:buSzPct val="75000"/>
             </a:pPr>
             <a:r>
-              <a:rPr lang="en-CA" sz="1600" b="1" dirty="0" err="1" smtClean="0"/>
+              <a:rPr lang="en-CA" sz="1200" b="1" dirty="0" err="1" smtClean="0"/>
               <a:t>Subteams</a:t>
             </a:r>
-            <a:endParaRPr lang="en-CA" sz="1600" b="1" dirty="0" smtClean="0"/>
+            <a:endParaRPr lang="en-CA" sz="1200" b="1" dirty="0" smtClean="0"/>
           </a:p>
           <a:p>
             <a:pPr marL="285750" indent="-285750">
@@ -4684,7 +4692,7 @@
               <a:buChar char="v"/>
             </a:pPr>
             <a:r>
-              <a:rPr lang="en-CA" sz="1600" dirty="0" smtClean="0"/>
+              <a:rPr lang="en-CA" sz="1200" dirty="0" smtClean="0"/>
               <a:t>Programming </a:t>
             </a:r>
           </a:p>
@@ -4695,7 +4703,7 @@
               <a:buChar char="v"/>
             </a:pPr>
             <a:r>
-              <a:rPr lang="en-CA" sz="1600" dirty="0" smtClean="0"/>
+              <a:rPr lang="en-CA" sz="1200" dirty="0" smtClean="0"/>
               <a:t>Strategy/Drive/Rules</a:t>
             </a:r>
           </a:p>
@@ -4706,10 +4714,10 @@
               <a:buChar char="v"/>
             </a:pPr>
             <a:r>
-              <a:rPr lang="en-CA" sz="1600" dirty="0" smtClean="0"/>
+              <a:rPr lang="en-CA" sz="1200" dirty="0" smtClean="0"/>
               <a:t>Scouting</a:t>
             </a:r>
-            <a:endParaRPr lang="en-CA" sz="1600" dirty="0"/>
+            <a:endParaRPr lang="en-CA" sz="1200" dirty="0"/>
           </a:p>
         </p:txBody>
       </p:sp>
@@ -4721,8 +4729,8 @@
         </p:nvSpPr>
         <p:spPr>
           <a:xfrm>
-            <a:off x="3538027" y="3431770"/>
-            <a:ext cx="2370091" cy="432048"/>
+            <a:off x="3285222" y="3008259"/>
+            <a:ext cx="1542901" cy="260168"/>
           </a:xfrm>
           <a:prstGeom prst="rect">
             <a:avLst/>
@@ -4779,8 +4787,8 @@
         </p:nvSpPr>
         <p:spPr>
           <a:xfrm>
-            <a:off x="3538028" y="4079842"/>
-            <a:ext cx="2370091" cy="432048"/>
+            <a:off x="3285222" y="3398512"/>
+            <a:ext cx="1542901" cy="260168"/>
           </a:xfrm>
           <a:prstGeom prst="rect">
             <a:avLst/>
@@ -4837,8 +4845,8 @@
         </p:nvSpPr>
         <p:spPr>
           <a:xfrm>
-            <a:off x="3538026" y="4727914"/>
-            <a:ext cx="2370091" cy="432048"/>
+            <a:off x="3285221" y="3788764"/>
+            <a:ext cx="1542901" cy="260168"/>
           </a:xfrm>
           <a:prstGeom prst="rect">
             <a:avLst/>
@@ -4895,8 +4903,8 @@
         </p:nvSpPr>
         <p:spPr>
           <a:xfrm>
-            <a:off x="6662487" y="3414947"/>
-            <a:ext cx="2370091" cy="432048"/>
+            <a:off x="5319208" y="2998129"/>
+            <a:ext cx="1542901" cy="260168"/>
           </a:xfrm>
           <a:prstGeom prst="rect">
             <a:avLst/>
@@ -4953,8 +4961,8 @@
         </p:nvSpPr>
         <p:spPr>
           <a:xfrm>
-            <a:off x="6662488" y="4063019"/>
-            <a:ext cx="2370091" cy="432048"/>
+            <a:off x="5319209" y="3388381"/>
+            <a:ext cx="1542901" cy="260168"/>
           </a:xfrm>
           <a:prstGeom prst="rect">
             <a:avLst/>
@@ -5011,8 +5019,8 @@
         </p:nvSpPr>
         <p:spPr>
           <a:xfrm>
-            <a:off x="6662486" y="4711091"/>
-            <a:ext cx="2370091" cy="432048"/>
+            <a:off x="5319208" y="3778633"/>
+            <a:ext cx="1542901" cy="260168"/>
           </a:xfrm>
           <a:prstGeom prst="rect">
             <a:avLst/>
@@ -5072,8 +5080,8 @@
         </p:nvCxnSpPr>
         <p:spPr>
           <a:xfrm>
-            <a:off x="1582838" y="2430200"/>
-            <a:ext cx="9024" cy="857554"/>
+            <a:off x="2012417" y="2405140"/>
+            <a:ext cx="5875" cy="516397"/>
           </a:xfrm>
           <a:prstGeom prst="line">
             <a:avLst/>
@@ -5110,8 +5118,8 @@
         </p:nvCxnSpPr>
         <p:spPr>
           <a:xfrm>
-            <a:off x="4718937" y="2428860"/>
-            <a:ext cx="4496" cy="834765"/>
+            <a:off x="4053980" y="2404333"/>
+            <a:ext cx="2927" cy="502674"/>
           </a:xfrm>
           <a:prstGeom prst="line">
             <a:avLst/>
@@ -5148,8 +5156,8 @@
         </p:nvCxnSpPr>
         <p:spPr>
           <a:xfrm>
-            <a:off x="7847534" y="2412116"/>
-            <a:ext cx="0" cy="840013"/>
+            <a:off x="6090660" y="2394250"/>
+            <a:ext cx="0" cy="505834"/>
           </a:xfrm>
           <a:prstGeom prst="line">
             <a:avLst/>
@@ -5183,8 +5191,8 @@
         </p:nvSpPr>
         <p:spPr>
           <a:xfrm>
-            <a:off x="20785" y="1342509"/>
-            <a:ext cx="1496692" cy="646331"/>
+            <a:off x="-252536" y="2033333"/>
+            <a:ext cx="1841341" cy="461665"/>
           </a:xfrm>
           <a:prstGeom prst="rect">
             <a:avLst/>
@@ -5192,27 +5200,331 @@
           <a:noFill/>
         </p:spPr>
         <p:txBody>
-          <a:bodyPr wrap="none" rtlCol="0">
+          <a:bodyPr wrap="square" rtlCol="0">
             <a:spAutoFit/>
           </a:bodyPr>
           <a:lstStyle/>
           <a:p>
             <a:pPr algn="ctr"/>
             <a:r>
-              <a:rPr lang="en-CA" dirty="0" smtClean="0"/>
+              <a:rPr lang="en-CA" sz="1200" dirty="0" smtClean="0"/>
               <a:t>Management </a:t>
             </a:r>
           </a:p>
           <a:p>
             <a:pPr algn="ctr"/>
             <a:r>
-              <a:rPr lang="en-CA" dirty="0" smtClean="0"/>
+              <a:rPr lang="en-CA" sz="1200" dirty="0" smtClean="0"/>
               <a:t>Team</a:t>
             </a:r>
-            <a:endParaRPr lang="en-CA" dirty="0"/>
-          </a:p>
-        </p:txBody>
-      </p:sp>
+            <a:endParaRPr lang="en-CA" sz="1200" dirty="0"/>
+          </a:p>
+        </p:txBody>
+      </p:sp>
+      <p:sp>
+        <p:nvSpPr>
+          <p:cNvPr id="34" name="Rectangle 33"/>
+          <p:cNvSpPr/>
+          <p:nvPr/>
+        </p:nvSpPr>
+        <p:spPr>
+          <a:xfrm>
+            <a:off x="7462728" y="2134082"/>
+            <a:ext cx="1542901" cy="260168"/>
+          </a:xfrm>
+          <a:prstGeom prst="rect">
+            <a:avLst/>
+          </a:prstGeom>
+          <a:noFill/>
+          <a:ln>
+            <a:solidFill>
+              <a:srgbClr val="002060"/>
+            </a:solidFill>
+          </a:ln>
+        </p:spPr>
+        <p:style>
+          <a:lnRef idx="2">
+            <a:schemeClr val="accent1">
+              <a:shade val="50000"/>
+            </a:schemeClr>
+          </a:lnRef>
+          <a:fillRef idx="1">
+            <a:schemeClr val="accent1"/>
+          </a:fillRef>
+          <a:effectRef idx="0">
+            <a:schemeClr val="accent1"/>
+          </a:effectRef>
+          <a:fontRef idx="minor">
+            <a:schemeClr val="lt1"/>
+          </a:fontRef>
+        </p:style>
+        <p:txBody>
+          <a:bodyPr rtlCol="0" anchor="ctr"/>
+          <a:lstStyle/>
+          <a:p>
+            <a:pPr algn="ctr"/>
+            <a:r>
+              <a:rPr lang="en-CA" sz="1200" dirty="0" smtClean="0">
+                <a:solidFill>
+                  <a:schemeClr val="tx1"/>
+                </a:solidFill>
+              </a:rPr>
+              <a:t>Team Support</a:t>
+            </a:r>
+            <a:endParaRPr lang="en-CA" sz="1200" dirty="0">
+              <a:solidFill>
+                <a:schemeClr val="tx1"/>
+              </a:solidFill>
+            </a:endParaRPr>
+          </a:p>
+        </p:txBody>
+      </p:sp>
+      <p:cxnSp>
+        <p:nvCxnSpPr>
+          <p:cNvPr id="35" name="Elbow Connector 34"/>
+          <p:cNvCxnSpPr>
+            <a:stCxn id="4" idx="2"/>
+            <a:endCxn id="34" idx="0"/>
+          </p:cNvCxnSpPr>
+          <p:nvPr/>
+        </p:nvCxnSpPr>
+        <p:spPr>
+          <a:xfrm rot="16200000" flipH="1">
+            <a:off x="5845371" y="-254727"/>
+            <a:ext cx="600109" cy="4177507"/>
+          </a:xfrm>
+          <a:prstGeom prst="bentConnector3">
+            <a:avLst>
+              <a:gd name="adj1" fmla="val 50000"/>
+            </a:avLst>
+          </a:prstGeom>
+          <a:ln w="28575">
+            <a:solidFill>
+              <a:srgbClr val="002060"/>
+            </a:solidFill>
+          </a:ln>
+        </p:spPr>
+        <p:style>
+          <a:lnRef idx="1">
+            <a:schemeClr val="accent1"/>
+          </a:lnRef>
+          <a:fillRef idx="0">
+            <a:schemeClr val="accent1"/>
+          </a:fillRef>
+          <a:effectRef idx="0">
+            <a:schemeClr val="accent1"/>
+          </a:effectRef>
+          <a:fontRef idx="minor">
+            <a:schemeClr val="tx1"/>
+          </a:fontRef>
+        </p:style>
+      </p:cxnSp>
+      <p:sp>
+        <p:nvSpPr>
+          <p:cNvPr id="39" name="Rectangle 38"/>
+          <p:cNvSpPr/>
+          <p:nvPr/>
+        </p:nvSpPr>
+        <p:spPr>
+          <a:xfrm>
+            <a:off x="7375751" y="2908802"/>
+            <a:ext cx="1711234" cy="2037984"/>
+          </a:xfrm>
+          <a:prstGeom prst="rect">
+            <a:avLst/>
+          </a:prstGeom>
+          <a:solidFill>
+            <a:schemeClr val="accent4">
+              <a:lumMod val="20000"/>
+              <a:lumOff val="80000"/>
+            </a:schemeClr>
+          </a:solidFill>
+          <a:ln>
+            <a:solidFill>
+              <a:schemeClr val="accent4">
+                <a:lumMod val="20000"/>
+                <a:lumOff val="80000"/>
+              </a:schemeClr>
+            </a:solidFill>
+          </a:ln>
+        </p:spPr>
+        <p:style>
+          <a:lnRef idx="2">
+            <a:schemeClr val="accent6"/>
+          </a:lnRef>
+          <a:fillRef idx="1">
+            <a:schemeClr val="lt1"/>
+          </a:fillRef>
+          <a:effectRef idx="0">
+            <a:schemeClr val="accent6"/>
+          </a:effectRef>
+          <a:fontRef idx="minor">
+            <a:schemeClr val="dk1"/>
+          </a:fontRef>
+        </p:style>
+        <p:txBody>
+          <a:bodyPr rtlCol="0" anchor="ctr"/>
+          <a:lstStyle/>
+          <a:p>
+            <a:pPr algn="ctr"/>
+            <a:endParaRPr lang="en-CA"/>
+          </a:p>
+        </p:txBody>
+      </p:sp>
+      <p:sp>
+        <p:nvSpPr>
+          <p:cNvPr id="41" name="Rectangle 40"/>
+          <p:cNvSpPr/>
+          <p:nvPr/>
+        </p:nvSpPr>
+        <p:spPr>
+          <a:xfrm>
+            <a:off x="7478966" y="3006847"/>
+            <a:ext cx="1542901" cy="260168"/>
+          </a:xfrm>
+          <a:prstGeom prst="rect">
+            <a:avLst/>
+          </a:prstGeom>
+          <a:noFill/>
+          <a:ln>
+            <a:solidFill>
+              <a:srgbClr val="002060"/>
+            </a:solidFill>
+          </a:ln>
+        </p:spPr>
+        <p:style>
+          <a:lnRef idx="2">
+            <a:schemeClr val="accent1">
+              <a:shade val="50000"/>
+            </a:schemeClr>
+          </a:lnRef>
+          <a:fillRef idx="1">
+            <a:schemeClr val="accent1"/>
+          </a:fillRef>
+          <a:effectRef idx="0">
+            <a:schemeClr val="accent1"/>
+          </a:effectRef>
+          <a:fontRef idx="minor">
+            <a:schemeClr val="lt1"/>
+          </a:fontRef>
+        </p:style>
+        <p:txBody>
+          <a:bodyPr rtlCol="0" anchor="ctr"/>
+          <a:lstStyle/>
+          <a:p>
+            <a:pPr algn="ctr"/>
+            <a:r>
+              <a:rPr lang="en-CA" dirty="0" smtClean="0">
+                <a:solidFill>
+                  <a:schemeClr val="tx1"/>
+                </a:solidFill>
+              </a:rPr>
+              <a:t>Mentors</a:t>
+            </a:r>
+            <a:endParaRPr lang="en-CA" dirty="0">
+              <a:solidFill>
+                <a:schemeClr val="tx1"/>
+              </a:solidFill>
+            </a:endParaRPr>
+          </a:p>
+        </p:txBody>
+      </p:sp>
+      <p:sp>
+        <p:nvSpPr>
+          <p:cNvPr id="42" name="Rectangle 41"/>
+          <p:cNvSpPr/>
+          <p:nvPr/>
+        </p:nvSpPr>
+        <p:spPr>
+          <a:xfrm>
+            <a:off x="7478967" y="3397099"/>
+            <a:ext cx="1542901" cy="260168"/>
+          </a:xfrm>
+          <a:prstGeom prst="rect">
+            <a:avLst/>
+          </a:prstGeom>
+          <a:noFill/>
+          <a:ln>
+            <a:solidFill>
+              <a:srgbClr val="002060"/>
+            </a:solidFill>
+          </a:ln>
+        </p:spPr>
+        <p:style>
+          <a:lnRef idx="2">
+            <a:schemeClr val="accent1">
+              <a:shade val="50000"/>
+            </a:schemeClr>
+          </a:lnRef>
+          <a:fillRef idx="1">
+            <a:schemeClr val="accent1"/>
+          </a:fillRef>
+          <a:effectRef idx="0">
+            <a:schemeClr val="accent1"/>
+          </a:effectRef>
+          <a:fontRef idx="minor">
+            <a:schemeClr val="lt1"/>
+          </a:fontRef>
+        </p:style>
+        <p:txBody>
+          <a:bodyPr rtlCol="0" anchor="ctr"/>
+          <a:lstStyle/>
+          <a:p>
+            <a:pPr algn="ctr"/>
+            <a:r>
+              <a:rPr lang="en-CA" dirty="0" smtClean="0">
+                <a:solidFill>
+                  <a:schemeClr val="tx1"/>
+                </a:solidFill>
+              </a:rPr>
+              <a:t>Parents</a:t>
+            </a:r>
+            <a:endParaRPr lang="en-CA" dirty="0">
+              <a:solidFill>
+                <a:schemeClr val="tx1"/>
+              </a:solidFill>
+            </a:endParaRPr>
+          </a:p>
+        </p:txBody>
+      </p:sp>
+      <p:cxnSp>
+        <p:nvCxnSpPr>
+          <p:cNvPr id="44" name="Straight Connector 43"/>
+          <p:cNvCxnSpPr>
+            <a:stCxn id="34" idx="2"/>
+            <a:endCxn id="39" idx="0"/>
+          </p:cNvCxnSpPr>
+          <p:nvPr/>
+        </p:nvCxnSpPr>
+        <p:spPr>
+          <a:xfrm flipH="1">
+            <a:off x="8231368" y="2394250"/>
+            <a:ext cx="2811" cy="514552"/>
+          </a:xfrm>
+          <a:prstGeom prst="line">
+            <a:avLst/>
+          </a:prstGeom>
+          <a:ln w="28575">
+            <a:solidFill>
+              <a:srgbClr val="002060"/>
+            </a:solidFill>
+          </a:ln>
+        </p:spPr>
+        <p:style>
+          <a:lnRef idx="1">
+            <a:schemeClr val="accent1"/>
+          </a:lnRef>
+          <a:fillRef idx="0">
+            <a:schemeClr val="accent1"/>
+          </a:fillRef>
+          <a:effectRef idx="0">
+            <a:schemeClr val="accent1"/>
+          </a:effectRef>
+          <a:fontRef idx="minor">
+            <a:schemeClr val="tx1"/>
+          </a:fontRef>
+        </p:style>
+      </p:cxnSp>
     </p:spTree>
     <p:extLst>
       <p:ext uri="{BB962C8B-B14F-4D97-AF65-F5344CB8AC3E}">

</xml_diff>